<commit_message>
Added Profiling screenshot with Chrome Dev Tool
</commit_message>
<xml_diff>
--- a/Final Milestone.pptx
+++ b/Final Milestone.pptx
@@ -8,10 +8,11 @@
     <p:sldId id="256" r:id="rId2"/>
     <p:sldId id="257" r:id="rId3"/>
     <p:sldId id="262" r:id="rId4"/>
-    <p:sldId id="258" r:id="rId5"/>
-    <p:sldId id="261" r:id="rId6"/>
-    <p:sldId id="259" r:id="rId7"/>
-    <p:sldId id="260" r:id="rId8"/>
+    <p:sldId id="263" r:id="rId5"/>
+    <p:sldId id="258" r:id="rId6"/>
+    <p:sldId id="261" r:id="rId7"/>
+    <p:sldId id="259" r:id="rId8"/>
+    <p:sldId id="260" r:id="rId9"/>
   </p:sldIdLst>
   <p:sldSz cx="12192000" cy="6858000"/>
   <p:notesSz cx="6858000" cy="9144000"/>
@@ -840,7 +841,7 @@
           <a:p>
             <a:fld id="{E9AACBFD-08B3-490C-A769-0E1BE36B005D}" type="datetimeFigureOut">
               <a:rPr lang="en-US" smtClean="0"/>
-              <a:t>11/20/2020</a:t>
+              <a:t>11/24/2020</a:t>
             </a:fld>
             <a:endParaRPr lang="en-US"/>
           </a:p>
@@ -1091,7 +1092,7 @@
           <a:p>
             <a:fld id="{E9AACBFD-08B3-490C-A769-0E1BE36B005D}" type="datetimeFigureOut">
               <a:rPr lang="en-US" smtClean="0"/>
-              <a:t>11/20/2020</a:t>
+              <a:t>11/24/2020</a:t>
             </a:fld>
             <a:endParaRPr lang="en-US"/>
           </a:p>
@@ -1405,7 +1406,7 @@
           <a:p>
             <a:fld id="{E9AACBFD-08B3-490C-A769-0E1BE36B005D}" type="datetimeFigureOut">
               <a:rPr lang="en-US" smtClean="0"/>
-              <a:t>11/20/2020</a:t>
+              <a:t>11/24/2020</a:t>
             </a:fld>
             <a:endParaRPr lang="en-US"/>
           </a:p>
@@ -1746,7 +1747,7 @@
           <a:p>
             <a:fld id="{E9AACBFD-08B3-490C-A769-0E1BE36B005D}" type="datetimeFigureOut">
               <a:rPr lang="en-US" smtClean="0"/>
-              <a:t>11/20/2020</a:t>
+              <a:t>11/24/2020</a:t>
             </a:fld>
             <a:endParaRPr lang="en-US"/>
           </a:p>
@@ -2060,7 +2061,7 @@
           <a:p>
             <a:fld id="{E9AACBFD-08B3-490C-A769-0E1BE36B005D}" type="datetimeFigureOut">
               <a:rPr lang="en-US" smtClean="0"/>
-              <a:t>11/20/2020</a:t>
+              <a:t>11/24/2020</a:t>
             </a:fld>
             <a:endParaRPr lang="en-US"/>
           </a:p>
@@ -2453,7 +2454,7 @@
           <a:p>
             <a:fld id="{E9AACBFD-08B3-490C-A769-0E1BE36B005D}" type="datetimeFigureOut">
               <a:rPr lang="en-US" smtClean="0"/>
-              <a:t>11/20/2020</a:t>
+              <a:t>11/24/2020</a:t>
             </a:fld>
             <a:endParaRPr lang="en-US"/>
           </a:p>
@@ -2623,7 +2624,7 @@
           <a:p>
             <a:fld id="{E9AACBFD-08B3-490C-A769-0E1BE36B005D}" type="datetimeFigureOut">
               <a:rPr lang="en-US" smtClean="0"/>
-              <a:t>11/20/2020</a:t>
+              <a:t>11/24/2020</a:t>
             </a:fld>
             <a:endParaRPr lang="en-US"/>
           </a:p>
@@ -2803,7 +2804,7 @@
           <a:p>
             <a:fld id="{E9AACBFD-08B3-490C-A769-0E1BE36B005D}" type="datetimeFigureOut">
               <a:rPr lang="en-US" smtClean="0"/>
-              <a:t>11/20/2020</a:t>
+              <a:t>11/24/2020</a:t>
             </a:fld>
             <a:endParaRPr lang="en-US"/>
           </a:p>
@@ -2979,7 +2980,7 @@
           <a:p>
             <a:fld id="{E9AACBFD-08B3-490C-A769-0E1BE36B005D}" type="datetimeFigureOut">
               <a:rPr lang="en-US" smtClean="0"/>
-              <a:t>11/20/2020</a:t>
+              <a:t>11/24/2020</a:t>
             </a:fld>
             <a:endParaRPr lang="en-US"/>
           </a:p>
@@ -3226,7 +3227,7 @@
           <a:p>
             <a:fld id="{E9AACBFD-08B3-490C-A769-0E1BE36B005D}" type="datetimeFigureOut">
               <a:rPr lang="en-US" smtClean="0"/>
-              <a:t>11/20/2020</a:t>
+              <a:t>11/24/2020</a:t>
             </a:fld>
             <a:endParaRPr lang="en-US"/>
           </a:p>
@@ -3458,7 +3459,7 @@
           <a:p>
             <a:fld id="{E9AACBFD-08B3-490C-A769-0E1BE36B005D}" type="datetimeFigureOut">
               <a:rPr lang="en-US" smtClean="0"/>
-              <a:t>11/20/2020</a:t>
+              <a:t>11/24/2020</a:t>
             </a:fld>
             <a:endParaRPr lang="en-US"/>
           </a:p>
@@ -3832,7 +3833,7 @@
           <a:p>
             <a:fld id="{E9AACBFD-08B3-490C-A769-0E1BE36B005D}" type="datetimeFigureOut">
               <a:rPr lang="en-US" smtClean="0"/>
-              <a:t>11/20/2020</a:t>
+              <a:t>11/24/2020</a:t>
             </a:fld>
             <a:endParaRPr lang="en-US"/>
           </a:p>
@@ -3955,7 +3956,7 @@
           <a:p>
             <a:fld id="{E9AACBFD-08B3-490C-A769-0E1BE36B005D}" type="datetimeFigureOut">
               <a:rPr lang="en-US" smtClean="0"/>
-              <a:t>11/20/2020</a:t>
+              <a:t>11/24/2020</a:t>
             </a:fld>
             <a:endParaRPr lang="en-US"/>
           </a:p>
@@ -4050,7 +4051,7 @@
           <a:p>
             <a:fld id="{E9AACBFD-08B3-490C-A769-0E1BE36B005D}" type="datetimeFigureOut">
               <a:rPr lang="en-US" smtClean="0"/>
-              <a:t>11/20/2020</a:t>
+              <a:t>11/24/2020</a:t>
             </a:fld>
             <a:endParaRPr lang="en-US"/>
           </a:p>
@@ -4305,7 +4306,7 @@
           <a:p>
             <a:fld id="{E9AACBFD-08B3-490C-A769-0E1BE36B005D}" type="datetimeFigureOut">
               <a:rPr lang="en-US" smtClean="0"/>
-              <a:t>11/20/2020</a:t>
+              <a:t>11/24/2020</a:t>
             </a:fld>
             <a:endParaRPr lang="en-US"/>
           </a:p>
@@ -4568,7 +4569,7 @@
           <a:p>
             <a:fld id="{E9AACBFD-08B3-490C-A769-0E1BE36B005D}" type="datetimeFigureOut">
               <a:rPr lang="en-US" smtClean="0"/>
-              <a:t>11/20/2020</a:t>
+              <a:t>11/24/2020</a:t>
             </a:fld>
             <a:endParaRPr lang="en-US"/>
           </a:p>
@@ -5311,7 +5312,7 @@
           <a:p>
             <a:fld id="{E9AACBFD-08B3-490C-A769-0E1BE36B005D}" type="datetimeFigureOut">
               <a:rPr lang="en-US" smtClean="0"/>
-              <a:t>11/20/2020</a:t>
+              <a:t>11/24/2020</a:t>
             </a:fld>
             <a:endParaRPr lang="en-US"/>
           </a:p>
@@ -6862,7 +6863,7 @@
           <p:cNvPr id="2" name="Title 1">
             <a:extLst>
               <a:ext uri="{FF2B5EF4-FFF2-40B4-BE49-F238E27FC236}">
-                <a16:creationId xmlns:a16="http://schemas.microsoft.com/office/drawing/2014/main" id="{0539CFEF-5277-473C-9778-0C6BAC194E86}"/>
+                <a16:creationId xmlns:a16="http://schemas.microsoft.com/office/drawing/2014/main" id="{F398A38B-C3A3-4D05-8D81-1D9F4ECAC96A}"/>
               </a:ext>
             </a:extLst>
           </p:cNvPr>
@@ -6879,297 +6880,46 @@
           <a:lstStyle/>
           <a:p>
             <a:r>
-              <a:rPr lang="en-US" dirty="0"/>
-              <a:t>Individual Responsibilities of All Members For This Milestone</a:t>
-            </a:r>
-          </a:p>
-        </p:txBody>
-      </p:sp>
-      <p:sp>
-        <p:nvSpPr>
-          <p:cNvPr id="3" name="Content Placeholder 2">
+              <a:rPr lang="it-IT" dirty="0"/>
+              <a:t>Profiling With Chrome Dev tool</a:t>
+            </a:r>
+            <a:endParaRPr lang="en-US" dirty="0"/>
+          </a:p>
+        </p:txBody>
+      </p:sp>
+      <p:pic>
+        <p:nvPicPr>
+          <p:cNvPr id="5" name="Content Placeholder 4">
             <a:extLst>
               <a:ext uri="{FF2B5EF4-FFF2-40B4-BE49-F238E27FC236}">
-                <a16:creationId xmlns:a16="http://schemas.microsoft.com/office/drawing/2014/main" id="{DA87AE0C-F175-484B-8AB9-0D101B2037EE}"/>
+                <a16:creationId xmlns:a16="http://schemas.microsoft.com/office/drawing/2014/main" id="{55BB9E84-0C8B-427F-B2D2-B0647A99031A}"/>
               </a:ext>
             </a:extLst>
           </p:cNvPr>
-          <p:cNvSpPr>
-            <a:spLocks noGrp="1"/>
-          </p:cNvSpPr>
+          <p:cNvPicPr>
+            <a:picLocks noGrp="1" noChangeAspect="1"/>
+          </p:cNvPicPr>
           <p:nvPr>
             <p:ph idx="1"/>
           </p:nvPr>
-        </p:nvSpPr>
-        <p:spPr/>
-        <p:txBody>
-          <a:bodyPr/>
-          <a:lstStyle/>
-          <a:p>
-            <a:r>
-              <a:rPr lang="it-IT" dirty="0"/>
-              <a:t>Gabriele </a:t>
-            </a:r>
-            <a:r>
-              <a:rPr lang="it-IT" dirty="0" err="1"/>
-              <a:t>has</a:t>
-            </a:r>
-            <a:r>
-              <a:rPr lang="it-IT" dirty="0"/>
-              <a:t> </a:t>
-            </a:r>
-            <a:r>
-              <a:rPr lang="it-IT" dirty="0" err="1"/>
-              <a:t>fixed</a:t>
-            </a:r>
-            <a:r>
-              <a:rPr lang="it-IT" dirty="0"/>
-              <a:t> a </a:t>
-            </a:r>
-            <a:r>
-              <a:rPr lang="it-IT" dirty="0" err="1"/>
-              <a:t>problem</a:t>
-            </a:r>
-            <a:r>
-              <a:rPr lang="it-IT" dirty="0"/>
-              <a:t> with the </a:t>
-            </a:r>
-            <a:r>
-              <a:rPr lang="it-IT" dirty="0" err="1"/>
-              <a:t>deletion</a:t>
-            </a:r>
-            <a:r>
-              <a:rPr lang="it-IT" dirty="0"/>
-              <a:t> of the sound, </a:t>
-            </a:r>
-            <a:r>
-              <a:rPr lang="it-IT" dirty="0" err="1"/>
-              <a:t>earlier</a:t>
-            </a:r>
-            <a:r>
-              <a:rPr lang="it-IT" dirty="0"/>
-              <a:t> </a:t>
-            </a:r>
-            <a:r>
-              <a:rPr lang="it-IT" dirty="0" err="1"/>
-              <a:t>when</a:t>
-            </a:r>
-            <a:r>
-              <a:rPr lang="it-IT" dirty="0"/>
-              <a:t> </a:t>
-            </a:r>
-            <a:r>
-              <a:rPr lang="it-IT" dirty="0" err="1"/>
-              <a:t>we</a:t>
-            </a:r>
-            <a:r>
-              <a:rPr lang="it-IT" dirty="0"/>
-              <a:t> </a:t>
-            </a:r>
-            <a:r>
-              <a:rPr lang="it-IT" dirty="0" err="1"/>
-              <a:t>were</a:t>
-            </a:r>
-            <a:r>
-              <a:rPr lang="it-IT" dirty="0"/>
-              <a:t> </a:t>
-            </a:r>
-            <a:r>
-              <a:rPr lang="it-IT" dirty="0" err="1"/>
-              <a:t>clicking</a:t>
-            </a:r>
-            <a:r>
-              <a:rPr lang="it-IT" dirty="0"/>
-              <a:t> delete the stream </a:t>
-            </a:r>
-            <a:r>
-              <a:rPr lang="it-IT" dirty="0" err="1"/>
-              <a:t>would</a:t>
-            </a:r>
-            <a:r>
-              <a:rPr lang="it-IT" dirty="0"/>
-              <a:t> stay </a:t>
-            </a:r>
-            <a:r>
-              <a:rPr lang="it-IT" dirty="0" err="1"/>
-              <a:t>now</a:t>
-            </a:r>
-            <a:r>
-              <a:rPr lang="it-IT" dirty="0"/>
-              <a:t> </a:t>
-            </a:r>
-            <a:r>
-              <a:rPr lang="it-IT" dirty="0" err="1"/>
-              <a:t>when</a:t>
-            </a:r>
-            <a:r>
-              <a:rPr lang="it-IT" dirty="0"/>
-              <a:t> </a:t>
-            </a:r>
-            <a:r>
-              <a:rPr lang="it-IT" dirty="0" err="1"/>
-              <a:t>we</a:t>
-            </a:r>
-            <a:r>
-              <a:rPr lang="it-IT" dirty="0"/>
-              <a:t> delete the sound the stream </a:t>
-            </a:r>
-            <a:r>
-              <a:rPr lang="it-IT" dirty="0" err="1"/>
-              <a:t>goes</a:t>
-            </a:r>
-            <a:r>
-              <a:rPr lang="it-IT" dirty="0"/>
-              <a:t> </a:t>
-            </a:r>
-            <a:r>
-              <a:rPr lang="it-IT" dirty="0" err="1"/>
-              <a:t>away</a:t>
-            </a:r>
-            <a:r>
-              <a:rPr lang="it-IT" dirty="0"/>
-              <a:t> with it. Big part of this milestone was </a:t>
-            </a:r>
-            <a:r>
-              <a:rPr lang="it-IT" dirty="0" err="1"/>
-              <a:t>figuring</a:t>
-            </a:r>
-            <a:r>
-              <a:rPr lang="it-IT" dirty="0"/>
-              <a:t> out the test </a:t>
-            </a:r>
-            <a:r>
-              <a:rPr lang="it-IT" dirty="0" err="1"/>
-              <a:t>cases</a:t>
-            </a:r>
-            <a:r>
-              <a:rPr lang="it-IT" dirty="0"/>
-              <a:t> with </a:t>
-            </a:r>
-            <a:r>
-              <a:rPr lang="it-IT" dirty="0" err="1"/>
-              <a:t>mocha</a:t>
-            </a:r>
-            <a:r>
-              <a:rPr lang="it-IT" dirty="0"/>
-              <a:t>, it </a:t>
-            </a:r>
-            <a:r>
-              <a:rPr lang="it-IT" dirty="0" err="1"/>
-              <a:t>took</a:t>
-            </a:r>
-            <a:r>
-              <a:rPr lang="it-IT" dirty="0"/>
-              <a:t> </a:t>
-            </a:r>
-            <a:r>
-              <a:rPr lang="it-IT" dirty="0" err="1"/>
-              <a:t>him</a:t>
-            </a:r>
-            <a:r>
-              <a:rPr lang="it-IT" dirty="0"/>
-              <a:t> a </a:t>
-            </a:r>
-            <a:r>
-              <a:rPr lang="it-IT" dirty="0" err="1"/>
-              <a:t>while</a:t>
-            </a:r>
-            <a:r>
-              <a:rPr lang="it-IT" dirty="0"/>
-              <a:t> but he </a:t>
-            </a:r>
-            <a:r>
-              <a:rPr lang="it-IT" dirty="0" err="1"/>
-              <a:t>figured</a:t>
-            </a:r>
-            <a:r>
-              <a:rPr lang="it-IT" dirty="0"/>
-              <a:t> it out. </a:t>
-            </a:r>
-            <a:r>
-              <a:rPr lang="it-IT" dirty="0" err="1"/>
-              <a:t>Also</a:t>
-            </a:r>
-            <a:r>
-              <a:rPr lang="it-IT" dirty="0"/>
-              <a:t> he </a:t>
-            </a:r>
-            <a:r>
-              <a:rPr lang="it-IT" dirty="0" err="1"/>
-              <a:t>found</a:t>
-            </a:r>
-            <a:r>
-              <a:rPr lang="it-IT" dirty="0"/>
-              <a:t> an online </a:t>
-            </a:r>
-            <a:r>
-              <a:rPr lang="it-IT" dirty="0" err="1"/>
-              <a:t>static</a:t>
-            </a:r>
-            <a:r>
-              <a:rPr lang="it-IT" dirty="0"/>
-              <a:t> </a:t>
-            </a:r>
-            <a:r>
-              <a:rPr lang="it-IT" dirty="0" err="1"/>
-              <a:t>analysis</a:t>
-            </a:r>
-            <a:r>
-              <a:rPr lang="it-IT" dirty="0"/>
-              <a:t> tool that </a:t>
-            </a:r>
-            <a:r>
-              <a:rPr lang="it-IT" dirty="0" err="1"/>
-              <a:t>we</a:t>
-            </a:r>
-            <a:r>
-              <a:rPr lang="it-IT" dirty="0"/>
-              <a:t> use to do </a:t>
-            </a:r>
-            <a:r>
-              <a:rPr lang="it-IT" dirty="0" err="1"/>
-              <a:t>our</a:t>
-            </a:r>
-            <a:r>
-              <a:rPr lang="it-IT" dirty="0"/>
-              <a:t> </a:t>
-            </a:r>
-            <a:r>
-              <a:rPr lang="it-IT" dirty="0" err="1"/>
-              <a:t>static</a:t>
-            </a:r>
-            <a:r>
-              <a:rPr lang="it-IT" dirty="0"/>
-              <a:t> </a:t>
-            </a:r>
-            <a:r>
-              <a:rPr lang="it-IT" dirty="0" err="1"/>
-              <a:t>analysis</a:t>
-            </a:r>
-            <a:r>
-              <a:rPr lang="it-IT" dirty="0"/>
-              <a:t> part of the project. He </a:t>
-            </a:r>
-            <a:r>
-              <a:rPr lang="it-IT" dirty="0" err="1"/>
-              <a:t>launch</a:t>
-            </a:r>
-            <a:r>
-              <a:rPr lang="it-IT" dirty="0"/>
-              <a:t> the website on </a:t>
-            </a:r>
-            <a:r>
-              <a:rPr lang="it-IT" dirty="0" err="1"/>
-              <a:t>github.io</a:t>
-            </a:r>
-            <a:endParaRPr lang="en-US" dirty="0"/>
-          </a:p>
-        </p:txBody>
-      </p:sp>
+        </p:nvPicPr>
+        <p:blipFill>
+          <a:blip r:embed="rId2"/>
+          <a:stretch>
+            <a:fillRect/>
+          </a:stretch>
+        </p:blipFill>
+        <p:spPr>
+          <a:xfrm>
+            <a:off x="808033" y="2160588"/>
+            <a:ext cx="8335972" cy="3881437"/>
+          </a:xfrm>
+        </p:spPr>
+      </p:pic>
     </p:spTree>
     <p:extLst>
       <p:ext uri="{BB962C8B-B14F-4D97-AF65-F5344CB8AC3E}">
-        <p14:creationId xmlns:p14="http://schemas.microsoft.com/office/powerpoint/2010/main" val="875491310"/>
+        <p14:creationId xmlns:p14="http://schemas.microsoft.com/office/powerpoint/2010/main" val="727783594"/>
       </p:ext>
     </p:extLst>
   </p:cSld>
@@ -7201,7 +6951,7 @@
           <p:cNvPr id="2" name="Title 1">
             <a:extLst>
               <a:ext uri="{FF2B5EF4-FFF2-40B4-BE49-F238E27FC236}">
-                <a16:creationId xmlns:a16="http://schemas.microsoft.com/office/drawing/2014/main" id="{ECA6F8B9-F1BA-4D70-8DBE-E1853B9D1A0A}"/>
+                <a16:creationId xmlns:a16="http://schemas.microsoft.com/office/drawing/2014/main" id="{0539CFEF-5277-473C-9778-0C6BAC194E86}"/>
               </a:ext>
             </a:extLst>
           </p:cNvPr>
@@ -7219,7 +6969,7 @@
           <a:p>
             <a:r>
               <a:rPr lang="en-US" dirty="0"/>
-              <a:t>Individual Contributions During The Entire Project</a:t>
+              <a:t>Individual Responsibilities of All Members For This Milestone</a:t>
             </a:r>
           </a:p>
         </p:txBody>
@@ -7229,7 +6979,7 @@
           <p:cNvPr id="3" name="Content Placeholder 2">
             <a:extLst>
               <a:ext uri="{FF2B5EF4-FFF2-40B4-BE49-F238E27FC236}">
-                <a16:creationId xmlns:a16="http://schemas.microsoft.com/office/drawing/2014/main" id="{BD2139C5-96F2-4750-BF7F-24F98811BF8D}"/>
+                <a16:creationId xmlns:a16="http://schemas.microsoft.com/office/drawing/2014/main" id="{DA87AE0C-F175-484B-8AB9-0D101B2037EE}"/>
               </a:ext>
             </a:extLst>
           </p:cNvPr>
@@ -7247,19 +6997,11 @@
           <a:p>
             <a:r>
               <a:rPr lang="it-IT" dirty="0"/>
-              <a:t>Gabriele: it was rough </a:t>
-            </a:r>
-            <a:r>
-              <a:rPr lang="it-IT" dirty="0" err="1"/>
-              <a:t>at</a:t>
-            </a:r>
-            <a:r>
-              <a:rPr lang="it-IT" dirty="0"/>
-              <a:t> the </a:t>
-            </a:r>
-            <a:r>
-              <a:rPr lang="it-IT" dirty="0" err="1"/>
-              <a:t>beginning</a:t>
+              <a:t>Gabriele </a:t>
+            </a:r>
+            <a:r>
+              <a:rPr lang="it-IT" dirty="0" err="1"/>
+              <a:t>has</a:t>
             </a:r>
             <a:r>
               <a:rPr lang="it-IT" dirty="0"/>
@@ -7267,6 +7009,46 @@
             </a:r>
             <a:r>
               <a:rPr lang="it-IT" dirty="0" err="1"/>
+              <a:t>fixed</a:t>
+            </a:r>
+            <a:r>
+              <a:rPr lang="it-IT" dirty="0"/>
+              <a:t> a </a:t>
+            </a:r>
+            <a:r>
+              <a:rPr lang="it-IT" dirty="0" err="1"/>
+              <a:t>problem</a:t>
+            </a:r>
+            <a:r>
+              <a:rPr lang="it-IT" dirty="0"/>
+              <a:t> with the </a:t>
+            </a:r>
+            <a:r>
+              <a:rPr lang="it-IT" dirty="0" err="1"/>
+              <a:t>deletion</a:t>
+            </a:r>
+            <a:r>
+              <a:rPr lang="it-IT" dirty="0"/>
+              <a:t> of the sound, </a:t>
+            </a:r>
+            <a:r>
+              <a:rPr lang="it-IT" dirty="0" err="1"/>
+              <a:t>earlier</a:t>
+            </a:r>
+            <a:r>
+              <a:rPr lang="it-IT" dirty="0"/>
+              <a:t> </a:t>
+            </a:r>
+            <a:r>
+              <a:rPr lang="it-IT" dirty="0" err="1"/>
+              <a:t>when</a:t>
+            </a:r>
+            <a:r>
+              <a:rPr lang="it-IT" dirty="0"/>
+              <a:t> </a:t>
+            </a:r>
+            <a:r>
+              <a:rPr lang="it-IT" dirty="0" err="1"/>
               <a:t>we</a:t>
             </a:r>
             <a:r>
@@ -7275,7 +7057,103 @@
             </a:r>
             <a:r>
               <a:rPr lang="it-IT" dirty="0" err="1"/>
-              <a:t>had</a:t>
+              <a:t>were</a:t>
+            </a:r>
+            <a:r>
+              <a:rPr lang="it-IT" dirty="0"/>
+              <a:t> </a:t>
+            </a:r>
+            <a:r>
+              <a:rPr lang="it-IT" dirty="0" err="1"/>
+              <a:t>clicking</a:t>
+            </a:r>
+            <a:r>
+              <a:rPr lang="it-IT" dirty="0"/>
+              <a:t> delete the stream </a:t>
+            </a:r>
+            <a:r>
+              <a:rPr lang="it-IT" dirty="0" err="1"/>
+              <a:t>would</a:t>
+            </a:r>
+            <a:r>
+              <a:rPr lang="it-IT" dirty="0"/>
+              <a:t> stay </a:t>
+            </a:r>
+            <a:r>
+              <a:rPr lang="it-IT" dirty="0" err="1"/>
+              <a:t>now</a:t>
+            </a:r>
+            <a:r>
+              <a:rPr lang="it-IT" dirty="0"/>
+              <a:t> </a:t>
+            </a:r>
+            <a:r>
+              <a:rPr lang="it-IT" dirty="0" err="1"/>
+              <a:t>when</a:t>
+            </a:r>
+            <a:r>
+              <a:rPr lang="it-IT" dirty="0"/>
+              <a:t> </a:t>
+            </a:r>
+            <a:r>
+              <a:rPr lang="it-IT" dirty="0" err="1"/>
+              <a:t>we</a:t>
+            </a:r>
+            <a:r>
+              <a:rPr lang="it-IT" dirty="0"/>
+              <a:t> delete the sound the stream </a:t>
+            </a:r>
+            <a:r>
+              <a:rPr lang="it-IT" dirty="0" err="1"/>
+              <a:t>goes</a:t>
+            </a:r>
+            <a:r>
+              <a:rPr lang="it-IT" dirty="0"/>
+              <a:t> </a:t>
+            </a:r>
+            <a:r>
+              <a:rPr lang="it-IT" dirty="0" err="1"/>
+              <a:t>away</a:t>
+            </a:r>
+            <a:r>
+              <a:rPr lang="it-IT" dirty="0"/>
+              <a:t> with it. Big part of this milestone was </a:t>
+            </a:r>
+            <a:r>
+              <a:rPr lang="it-IT" dirty="0" err="1"/>
+              <a:t>figuring</a:t>
+            </a:r>
+            <a:r>
+              <a:rPr lang="it-IT" dirty="0"/>
+              <a:t> out the test </a:t>
+            </a:r>
+            <a:r>
+              <a:rPr lang="it-IT" dirty="0" err="1"/>
+              <a:t>cases</a:t>
+            </a:r>
+            <a:r>
+              <a:rPr lang="it-IT" dirty="0"/>
+              <a:t> with </a:t>
+            </a:r>
+            <a:r>
+              <a:rPr lang="it-IT" dirty="0" err="1"/>
+              <a:t>mocha</a:t>
+            </a:r>
+            <a:r>
+              <a:rPr lang="it-IT" dirty="0"/>
+              <a:t>, it </a:t>
+            </a:r>
+            <a:r>
+              <a:rPr lang="it-IT" dirty="0" err="1"/>
+              <a:t>took</a:t>
+            </a:r>
+            <a:r>
+              <a:rPr lang="it-IT" dirty="0"/>
+              <a:t> </a:t>
+            </a:r>
+            <a:r>
+              <a:rPr lang="it-IT" dirty="0" err="1"/>
+              <a:t>him</a:t>
             </a:r>
             <a:r>
               <a:rPr lang="it-IT" dirty="0"/>
@@ -7283,19 +7161,51 @@
             </a:r>
             <a:r>
               <a:rPr lang="it-IT" dirty="0" err="1"/>
-              <a:t>lot</a:t>
-            </a:r>
-            <a:r>
-              <a:rPr lang="it-IT" dirty="0"/>
-              <a:t> of people </a:t>
-            </a:r>
-            <a:r>
-              <a:rPr lang="it-IT" dirty="0" err="1"/>
-              <a:t>dropping</a:t>
-            </a:r>
-            <a:r>
-              <a:rPr lang="it-IT" dirty="0"/>
-              <a:t> and </a:t>
+              <a:t>while</a:t>
+            </a:r>
+            <a:r>
+              <a:rPr lang="it-IT" dirty="0"/>
+              <a:t> but he </a:t>
+            </a:r>
+            <a:r>
+              <a:rPr lang="it-IT" dirty="0" err="1"/>
+              <a:t>figured</a:t>
+            </a:r>
+            <a:r>
+              <a:rPr lang="it-IT" dirty="0"/>
+              <a:t> it out. </a:t>
+            </a:r>
+            <a:r>
+              <a:rPr lang="it-IT" dirty="0" err="1"/>
+              <a:t>Also</a:t>
+            </a:r>
+            <a:r>
+              <a:rPr lang="it-IT" dirty="0"/>
+              <a:t> he </a:t>
+            </a:r>
+            <a:r>
+              <a:rPr lang="it-IT" dirty="0" err="1"/>
+              <a:t>found</a:t>
+            </a:r>
+            <a:r>
+              <a:rPr lang="it-IT" dirty="0"/>
+              <a:t> an online </a:t>
+            </a:r>
+            <a:r>
+              <a:rPr lang="it-IT" dirty="0" err="1"/>
+              <a:t>static</a:t>
+            </a:r>
+            <a:r>
+              <a:rPr lang="it-IT" dirty="0"/>
+              <a:t> </a:t>
+            </a:r>
+            <a:r>
+              <a:rPr lang="it-IT" dirty="0" err="1"/>
+              <a:t>analysis</a:t>
+            </a:r>
+            <a:r>
+              <a:rPr lang="it-IT" dirty="0"/>
+              <a:t> tool that </a:t>
             </a:r>
             <a:r>
               <a:rPr lang="it-IT" dirty="0" err="1"/>
@@ -7303,19 +7213,19 @@
             </a:r>
             <a:r>
               <a:rPr lang="it-IT" dirty="0"/>
+              <a:t> use to do </a:t>
+            </a:r>
+            <a:r>
+              <a:rPr lang="it-IT" dirty="0" err="1"/>
+              <a:t>our</a:t>
+            </a:r>
+            <a:r>
+              <a:rPr lang="it-IT" dirty="0"/>
               <a:t> </a:t>
             </a:r>
             <a:r>
               <a:rPr lang="it-IT" dirty="0" err="1"/>
-              <a:t>could</a:t>
-            </a:r>
-            <a:r>
-              <a:rPr lang="it-IT" dirty="0"/>
-              <a:t> not make up </a:t>
-            </a:r>
-            <a:r>
-              <a:rPr lang="it-IT" dirty="0" err="1"/>
-              <a:t>our</a:t>
+              <a:t>static</a:t>
             </a:r>
             <a:r>
               <a:rPr lang="it-IT" dirty="0"/>
@@ -7323,219 +7233,23 @@
             </a:r>
             <a:r>
               <a:rPr lang="it-IT" dirty="0" err="1"/>
-              <a:t>ideas</a:t>
-            </a:r>
-            <a:r>
-              <a:rPr lang="it-IT" dirty="0"/>
-              <a:t> on </a:t>
-            </a:r>
-            <a:r>
-              <a:rPr lang="it-IT" dirty="0" err="1"/>
-              <a:t>what</a:t>
-            </a:r>
-            <a:r>
-              <a:rPr lang="it-IT" dirty="0"/>
-              <a:t> to do. So, I </a:t>
-            </a:r>
-            <a:r>
-              <a:rPr lang="it-IT" dirty="0" err="1"/>
-              <a:t>took</a:t>
-            </a:r>
-            <a:r>
-              <a:rPr lang="it-IT" dirty="0"/>
-              <a:t> the lead and </a:t>
-            </a:r>
-            <a:r>
-              <a:rPr lang="it-IT" dirty="0" err="1"/>
-              <a:t>decided</a:t>
-            </a:r>
-            <a:r>
-              <a:rPr lang="it-IT" dirty="0"/>
-              <a:t> to do the </a:t>
-            </a:r>
-            <a:r>
-              <a:rPr lang="it-IT" dirty="0" err="1"/>
-              <a:t>given</a:t>
-            </a:r>
-            <a:r>
-              <a:rPr lang="it-IT" dirty="0"/>
-              <a:t> project in a web format. </a:t>
-            </a:r>
-            <a:r>
-              <a:rPr lang="it-IT" dirty="0" err="1"/>
-              <a:t>Develop</a:t>
-            </a:r>
-            <a:r>
-              <a:rPr lang="it-IT" dirty="0"/>
-              <a:t> the front-end and back-end. I was the </a:t>
-            </a:r>
-            <a:r>
-              <a:rPr lang="it-IT" dirty="0" err="1"/>
-              <a:t>manteiner</a:t>
-            </a:r>
-            <a:r>
-              <a:rPr lang="it-IT" dirty="0"/>
-              <a:t> for </a:t>
-            </a:r>
-            <a:r>
-              <a:rPr lang="it-IT" dirty="0" err="1"/>
-              <a:t>github</a:t>
-            </a:r>
-            <a:r>
-              <a:rPr lang="it-IT" dirty="0"/>
-              <a:t>. </a:t>
-            </a:r>
-            <a:r>
-              <a:rPr lang="it-IT" dirty="0" err="1"/>
-              <a:t>Created</a:t>
-            </a:r>
-            <a:r>
-              <a:rPr lang="it-IT" dirty="0"/>
-              <a:t> </a:t>
-            </a:r>
-            <a:r>
-              <a:rPr lang="it-IT" dirty="0" err="1"/>
-              <a:t>all</a:t>
-            </a:r>
-            <a:r>
-              <a:rPr lang="it-IT" dirty="0"/>
-              <a:t> the </a:t>
-            </a:r>
-            <a:r>
-              <a:rPr lang="it-IT" dirty="0" err="1"/>
-              <a:t>powerpoints</a:t>
-            </a:r>
-            <a:r>
-              <a:rPr lang="it-IT" dirty="0"/>
-              <a:t>. </a:t>
-            </a:r>
-            <a:r>
-              <a:rPr lang="it-IT" dirty="0" err="1"/>
-              <a:t>Develop</a:t>
-            </a:r>
-            <a:r>
-              <a:rPr lang="it-IT" dirty="0"/>
-              <a:t> the </a:t>
-            </a:r>
-            <a:r>
-              <a:rPr lang="it-IT" dirty="0" err="1"/>
-              <a:t>unit</a:t>
-            </a:r>
-            <a:r>
-              <a:rPr lang="it-IT" dirty="0"/>
-              <a:t> testing. </a:t>
-            </a:r>
-            <a:r>
-              <a:rPr lang="it-IT" dirty="0" err="1"/>
-              <a:t>Keep</a:t>
-            </a:r>
-            <a:r>
-              <a:rPr lang="it-IT" dirty="0"/>
-              <a:t> professors </a:t>
-            </a:r>
-            <a:r>
-              <a:rPr lang="it-IT" dirty="0" err="1"/>
-              <a:t>updated</a:t>
-            </a:r>
-            <a:r>
-              <a:rPr lang="it-IT" dirty="0"/>
-              <a:t> on the team situation. </a:t>
-            </a:r>
-            <a:r>
-              <a:rPr lang="it-IT" dirty="0" err="1"/>
-              <a:t>Try</a:t>
-            </a:r>
-            <a:r>
-              <a:rPr lang="it-IT" dirty="0"/>
-              <a:t> to </a:t>
-            </a:r>
-            <a:r>
-              <a:rPr lang="it-IT" dirty="0" err="1"/>
-              <a:t>find</a:t>
-            </a:r>
-            <a:r>
-              <a:rPr lang="it-IT" dirty="0"/>
-              <a:t> times </a:t>
-            </a:r>
-            <a:r>
-              <a:rPr lang="it-IT" dirty="0" err="1"/>
-              <a:t>every</a:t>
-            </a:r>
-            <a:r>
-              <a:rPr lang="it-IT" dirty="0"/>
-              <a:t> week </a:t>
-            </a:r>
-            <a:r>
-              <a:rPr lang="it-IT" dirty="0" err="1"/>
-              <a:t>where</a:t>
-            </a:r>
-            <a:r>
-              <a:rPr lang="it-IT" dirty="0"/>
-              <a:t> </a:t>
-            </a:r>
-            <a:r>
-              <a:rPr lang="it-IT" dirty="0" err="1"/>
-              <a:t>everybody</a:t>
-            </a:r>
-            <a:r>
-              <a:rPr lang="it-IT" dirty="0"/>
-              <a:t> </a:t>
-            </a:r>
-            <a:r>
-              <a:rPr lang="it-IT" dirty="0" err="1"/>
-              <a:t>could</a:t>
-            </a:r>
-            <a:r>
-              <a:rPr lang="it-IT" dirty="0"/>
-              <a:t> </a:t>
-            </a:r>
-            <a:r>
-              <a:rPr lang="it-IT" dirty="0" err="1"/>
-              <a:t>meet</a:t>
-            </a:r>
-            <a:r>
-              <a:rPr lang="it-IT" dirty="0"/>
-              <a:t>, </a:t>
-            </a:r>
-            <a:r>
-              <a:rPr lang="it-IT" dirty="0" err="1"/>
-              <a:t>when</a:t>
-            </a:r>
-            <a:r>
-              <a:rPr lang="it-IT" dirty="0"/>
-              <a:t> </a:t>
-            </a:r>
-            <a:r>
-              <a:rPr lang="it-IT" dirty="0" err="1"/>
-              <a:t>we</a:t>
-            </a:r>
-            <a:r>
-              <a:rPr lang="it-IT" dirty="0"/>
-              <a:t> </a:t>
-            </a:r>
-            <a:r>
-              <a:rPr lang="it-IT" dirty="0" err="1"/>
-              <a:t>were</a:t>
-            </a:r>
-            <a:r>
-              <a:rPr lang="it-IT" dirty="0"/>
-              <a:t> more </a:t>
-            </a:r>
-            <a:r>
-              <a:rPr lang="it-IT" dirty="0" err="1"/>
-              <a:t>than</a:t>
-            </a:r>
-            <a:r>
-              <a:rPr lang="it-IT" dirty="0"/>
-              <a:t> just </a:t>
-            </a:r>
-            <a:r>
-              <a:rPr lang="it-IT" dirty="0" err="1"/>
-              <a:t>two</a:t>
-            </a:r>
-            <a:r>
-              <a:rPr lang="it-IT" dirty="0"/>
-              <a:t>. </a:t>
+              <a:t>analysis</a:t>
+            </a:r>
+            <a:r>
+              <a:rPr lang="it-IT" dirty="0"/>
+              <a:t> part of the project. He </a:t>
+            </a:r>
+            <a:r>
+              <a:rPr lang="it-IT" dirty="0" err="1"/>
+              <a:t>launch</a:t>
+            </a:r>
+            <a:r>
+              <a:rPr lang="it-IT" dirty="0"/>
+              <a:t> the website on </a:t>
+            </a:r>
+            <a:r>
+              <a:rPr lang="it-IT" dirty="0" err="1"/>
+              <a:t>github.io</a:t>
             </a:r>
             <a:endParaRPr lang="en-US" dirty="0"/>
           </a:p>
@@ -7544,7 +7258,7 @@
     </p:spTree>
     <p:extLst>
       <p:ext uri="{BB962C8B-B14F-4D97-AF65-F5344CB8AC3E}">
-        <p14:creationId xmlns:p14="http://schemas.microsoft.com/office/powerpoint/2010/main" val="2082089089"/>
+        <p14:creationId xmlns:p14="http://schemas.microsoft.com/office/powerpoint/2010/main" val="875491310"/>
       </p:ext>
     </p:extLst>
   </p:cSld>
@@ -7576,6 +7290,381 @@
           <p:cNvPr id="2" name="Title 1">
             <a:extLst>
               <a:ext uri="{FF2B5EF4-FFF2-40B4-BE49-F238E27FC236}">
+                <a16:creationId xmlns:a16="http://schemas.microsoft.com/office/drawing/2014/main" id="{ECA6F8B9-F1BA-4D70-8DBE-E1853B9D1A0A}"/>
+              </a:ext>
+            </a:extLst>
+          </p:cNvPr>
+          <p:cNvSpPr>
+            <a:spLocks noGrp="1"/>
+          </p:cNvSpPr>
+          <p:nvPr>
+            <p:ph type="title"/>
+          </p:nvPr>
+        </p:nvSpPr>
+        <p:spPr/>
+        <p:txBody>
+          <a:bodyPr/>
+          <a:lstStyle/>
+          <a:p>
+            <a:r>
+              <a:rPr lang="en-US" dirty="0"/>
+              <a:t>Individual Contributions During The Entire Project</a:t>
+            </a:r>
+          </a:p>
+        </p:txBody>
+      </p:sp>
+      <p:sp>
+        <p:nvSpPr>
+          <p:cNvPr id="3" name="Content Placeholder 2">
+            <a:extLst>
+              <a:ext uri="{FF2B5EF4-FFF2-40B4-BE49-F238E27FC236}">
+                <a16:creationId xmlns:a16="http://schemas.microsoft.com/office/drawing/2014/main" id="{BD2139C5-96F2-4750-BF7F-24F98811BF8D}"/>
+              </a:ext>
+            </a:extLst>
+          </p:cNvPr>
+          <p:cNvSpPr>
+            <a:spLocks noGrp="1"/>
+          </p:cNvSpPr>
+          <p:nvPr>
+            <p:ph idx="1"/>
+          </p:nvPr>
+        </p:nvSpPr>
+        <p:spPr/>
+        <p:txBody>
+          <a:bodyPr/>
+          <a:lstStyle/>
+          <a:p>
+            <a:r>
+              <a:rPr lang="it-IT" dirty="0"/>
+              <a:t>Gabriele: it was rough </a:t>
+            </a:r>
+            <a:r>
+              <a:rPr lang="it-IT" dirty="0" err="1"/>
+              <a:t>at</a:t>
+            </a:r>
+            <a:r>
+              <a:rPr lang="it-IT" dirty="0"/>
+              <a:t> the </a:t>
+            </a:r>
+            <a:r>
+              <a:rPr lang="it-IT" dirty="0" err="1"/>
+              <a:t>beginning</a:t>
+            </a:r>
+            <a:r>
+              <a:rPr lang="it-IT" dirty="0"/>
+              <a:t> </a:t>
+            </a:r>
+            <a:r>
+              <a:rPr lang="it-IT" dirty="0" err="1"/>
+              <a:t>we</a:t>
+            </a:r>
+            <a:r>
+              <a:rPr lang="it-IT" dirty="0"/>
+              <a:t> </a:t>
+            </a:r>
+            <a:r>
+              <a:rPr lang="it-IT" dirty="0" err="1"/>
+              <a:t>had</a:t>
+            </a:r>
+            <a:r>
+              <a:rPr lang="it-IT" dirty="0"/>
+              <a:t> a </a:t>
+            </a:r>
+            <a:r>
+              <a:rPr lang="it-IT" dirty="0" err="1"/>
+              <a:t>lot</a:t>
+            </a:r>
+            <a:r>
+              <a:rPr lang="it-IT" dirty="0"/>
+              <a:t> of people </a:t>
+            </a:r>
+            <a:r>
+              <a:rPr lang="it-IT" dirty="0" err="1"/>
+              <a:t>dropping</a:t>
+            </a:r>
+            <a:r>
+              <a:rPr lang="it-IT" dirty="0"/>
+              <a:t> and </a:t>
+            </a:r>
+            <a:r>
+              <a:rPr lang="it-IT" dirty="0" err="1"/>
+              <a:t>we</a:t>
+            </a:r>
+            <a:r>
+              <a:rPr lang="it-IT" dirty="0"/>
+              <a:t> </a:t>
+            </a:r>
+            <a:r>
+              <a:rPr lang="it-IT" dirty="0" err="1"/>
+              <a:t>could</a:t>
+            </a:r>
+            <a:r>
+              <a:rPr lang="it-IT" dirty="0"/>
+              <a:t> not make up </a:t>
+            </a:r>
+            <a:r>
+              <a:rPr lang="it-IT" dirty="0" err="1"/>
+              <a:t>our</a:t>
+            </a:r>
+            <a:r>
+              <a:rPr lang="it-IT" dirty="0"/>
+              <a:t> </a:t>
+            </a:r>
+            <a:r>
+              <a:rPr lang="it-IT" dirty="0" err="1"/>
+              <a:t>ideas</a:t>
+            </a:r>
+            <a:r>
+              <a:rPr lang="it-IT" dirty="0"/>
+              <a:t> on </a:t>
+            </a:r>
+            <a:r>
+              <a:rPr lang="it-IT" dirty="0" err="1"/>
+              <a:t>what</a:t>
+            </a:r>
+            <a:r>
+              <a:rPr lang="it-IT" dirty="0"/>
+              <a:t> to do. So, I </a:t>
+            </a:r>
+            <a:r>
+              <a:rPr lang="it-IT" dirty="0" err="1"/>
+              <a:t>took</a:t>
+            </a:r>
+            <a:r>
+              <a:rPr lang="it-IT" dirty="0"/>
+              <a:t> the lead and </a:t>
+            </a:r>
+            <a:r>
+              <a:rPr lang="it-IT" dirty="0" err="1"/>
+              <a:t>decided</a:t>
+            </a:r>
+            <a:r>
+              <a:rPr lang="it-IT" dirty="0"/>
+              <a:t> to do the </a:t>
+            </a:r>
+            <a:r>
+              <a:rPr lang="it-IT" dirty="0" err="1"/>
+              <a:t>given</a:t>
+            </a:r>
+            <a:r>
+              <a:rPr lang="it-IT" dirty="0"/>
+              <a:t> project in a web format. </a:t>
+            </a:r>
+            <a:r>
+              <a:rPr lang="it-IT" dirty="0" err="1"/>
+              <a:t>Develop</a:t>
+            </a:r>
+            <a:r>
+              <a:rPr lang="it-IT" dirty="0"/>
+              <a:t> the front-end and back-end. I was the </a:t>
+            </a:r>
+            <a:r>
+              <a:rPr lang="it-IT" dirty="0" err="1"/>
+              <a:t>manteiner</a:t>
+            </a:r>
+            <a:r>
+              <a:rPr lang="it-IT" dirty="0"/>
+              <a:t> for </a:t>
+            </a:r>
+            <a:r>
+              <a:rPr lang="it-IT" dirty="0" err="1"/>
+              <a:t>github</a:t>
+            </a:r>
+            <a:r>
+              <a:rPr lang="it-IT" dirty="0"/>
+              <a:t>. </a:t>
+            </a:r>
+            <a:r>
+              <a:rPr lang="it-IT" dirty="0" err="1"/>
+              <a:t>Created</a:t>
+            </a:r>
+            <a:r>
+              <a:rPr lang="it-IT" dirty="0"/>
+              <a:t> </a:t>
+            </a:r>
+            <a:r>
+              <a:rPr lang="it-IT" dirty="0" err="1"/>
+              <a:t>all</a:t>
+            </a:r>
+            <a:r>
+              <a:rPr lang="it-IT" dirty="0"/>
+              <a:t> the </a:t>
+            </a:r>
+            <a:r>
+              <a:rPr lang="it-IT" dirty="0" err="1"/>
+              <a:t>powerpoints</a:t>
+            </a:r>
+            <a:r>
+              <a:rPr lang="it-IT" dirty="0"/>
+              <a:t>. </a:t>
+            </a:r>
+            <a:r>
+              <a:rPr lang="it-IT" dirty="0" err="1"/>
+              <a:t>Develop</a:t>
+            </a:r>
+            <a:r>
+              <a:rPr lang="it-IT" dirty="0"/>
+              <a:t> the </a:t>
+            </a:r>
+            <a:r>
+              <a:rPr lang="it-IT" dirty="0" err="1"/>
+              <a:t>unit</a:t>
+            </a:r>
+            <a:r>
+              <a:rPr lang="it-IT" dirty="0"/>
+              <a:t> testing. </a:t>
+            </a:r>
+            <a:r>
+              <a:rPr lang="it-IT" dirty="0" err="1"/>
+              <a:t>Keep</a:t>
+            </a:r>
+            <a:r>
+              <a:rPr lang="it-IT" dirty="0"/>
+              <a:t> professors </a:t>
+            </a:r>
+            <a:r>
+              <a:rPr lang="it-IT" dirty="0" err="1"/>
+              <a:t>updated</a:t>
+            </a:r>
+            <a:r>
+              <a:rPr lang="it-IT" dirty="0"/>
+              <a:t> on the team situation. </a:t>
+            </a:r>
+            <a:r>
+              <a:rPr lang="it-IT" dirty="0" err="1"/>
+              <a:t>Try</a:t>
+            </a:r>
+            <a:r>
+              <a:rPr lang="it-IT" dirty="0"/>
+              <a:t> to </a:t>
+            </a:r>
+            <a:r>
+              <a:rPr lang="it-IT" dirty="0" err="1"/>
+              <a:t>find</a:t>
+            </a:r>
+            <a:r>
+              <a:rPr lang="it-IT" dirty="0"/>
+              <a:t> times </a:t>
+            </a:r>
+            <a:r>
+              <a:rPr lang="it-IT" dirty="0" err="1"/>
+              <a:t>every</a:t>
+            </a:r>
+            <a:r>
+              <a:rPr lang="it-IT" dirty="0"/>
+              <a:t> week </a:t>
+            </a:r>
+            <a:r>
+              <a:rPr lang="it-IT" dirty="0" err="1"/>
+              <a:t>where</a:t>
+            </a:r>
+            <a:r>
+              <a:rPr lang="it-IT" dirty="0"/>
+              <a:t> </a:t>
+            </a:r>
+            <a:r>
+              <a:rPr lang="it-IT" dirty="0" err="1"/>
+              <a:t>everybody</a:t>
+            </a:r>
+            <a:r>
+              <a:rPr lang="it-IT" dirty="0"/>
+              <a:t> </a:t>
+            </a:r>
+            <a:r>
+              <a:rPr lang="it-IT" dirty="0" err="1"/>
+              <a:t>could</a:t>
+            </a:r>
+            <a:r>
+              <a:rPr lang="it-IT" dirty="0"/>
+              <a:t> </a:t>
+            </a:r>
+            <a:r>
+              <a:rPr lang="it-IT" dirty="0" err="1"/>
+              <a:t>meet</a:t>
+            </a:r>
+            <a:r>
+              <a:rPr lang="it-IT" dirty="0"/>
+              <a:t>, </a:t>
+            </a:r>
+            <a:r>
+              <a:rPr lang="it-IT" dirty="0" err="1"/>
+              <a:t>when</a:t>
+            </a:r>
+            <a:r>
+              <a:rPr lang="it-IT" dirty="0"/>
+              <a:t> </a:t>
+            </a:r>
+            <a:r>
+              <a:rPr lang="it-IT" dirty="0" err="1"/>
+              <a:t>we</a:t>
+            </a:r>
+            <a:r>
+              <a:rPr lang="it-IT" dirty="0"/>
+              <a:t> </a:t>
+            </a:r>
+            <a:r>
+              <a:rPr lang="it-IT" dirty="0" err="1"/>
+              <a:t>were</a:t>
+            </a:r>
+            <a:r>
+              <a:rPr lang="it-IT" dirty="0"/>
+              <a:t> more </a:t>
+            </a:r>
+            <a:r>
+              <a:rPr lang="it-IT" dirty="0" err="1"/>
+              <a:t>than</a:t>
+            </a:r>
+            <a:r>
+              <a:rPr lang="it-IT" dirty="0"/>
+              <a:t> just </a:t>
+            </a:r>
+            <a:r>
+              <a:rPr lang="it-IT" dirty="0" err="1"/>
+              <a:t>two</a:t>
+            </a:r>
+            <a:r>
+              <a:rPr lang="it-IT" dirty="0"/>
+              <a:t>. </a:t>
+            </a:r>
+            <a:endParaRPr lang="en-US" dirty="0"/>
+          </a:p>
+        </p:txBody>
+      </p:sp>
+    </p:spTree>
+    <p:extLst>
+      <p:ext uri="{BB962C8B-B14F-4D97-AF65-F5344CB8AC3E}">
+        <p14:creationId xmlns:p14="http://schemas.microsoft.com/office/powerpoint/2010/main" val="2082089089"/>
+      </p:ext>
+    </p:extLst>
+  </p:cSld>
+  <p:clrMapOvr>
+    <a:masterClrMapping/>
+  </p:clrMapOvr>
+</p:sld>
+</file>
+
+<file path=ppt/slides/slide7.xml><?xml version="1.0" encoding="utf-8"?>
+<p:sld xmlns:a="http://schemas.openxmlformats.org/drawingml/2006/main" xmlns:r="http://schemas.openxmlformats.org/officeDocument/2006/relationships" xmlns:p="http://schemas.openxmlformats.org/presentationml/2006/main">
+  <p:cSld>
+    <p:spTree>
+      <p:nvGrpSpPr>
+        <p:cNvPr id="1" name=""/>
+        <p:cNvGrpSpPr/>
+        <p:nvPr/>
+      </p:nvGrpSpPr>
+      <p:grpSpPr>
+        <a:xfrm>
+          <a:off x="0" y="0"/>
+          <a:ext cx="0" cy="0"/>
+          <a:chOff x="0" y="0"/>
+          <a:chExt cx="0" cy="0"/>
+        </a:xfrm>
+      </p:grpSpPr>
+      <p:sp>
+        <p:nvSpPr>
+          <p:cNvPr id="2" name="Title 1">
+            <a:extLst>
+              <a:ext uri="{FF2B5EF4-FFF2-40B4-BE49-F238E27FC236}">
                 <a16:creationId xmlns:a16="http://schemas.microsoft.com/office/drawing/2014/main" id="{370E1B98-F105-42AF-9F70-41FAABDD925F}"/>
               </a:ext>
             </a:extLst>
@@ -7681,7 +7770,7 @@
 </p:sld>
 </file>
 
-<file path=ppt/slides/slide7.xml><?xml version="1.0" encoding="utf-8"?>
+<file path=ppt/slides/slide8.xml><?xml version="1.0" encoding="utf-8"?>
 <p:sld xmlns:a="http://schemas.openxmlformats.org/drawingml/2006/main" xmlns:r="http://schemas.openxmlformats.org/officeDocument/2006/relationships" xmlns:p="http://schemas.openxmlformats.org/presentationml/2006/main">
   <p:cSld>
     <p:spTree>

</xml_diff>